<commit_message>
deleted a few letters
</commit_message>
<xml_diff>
--- a/1.pptx
+++ b/1.pptx
@@ -207,7 +207,7 @@
   </p:defaultTextStyle>
   <p:extLst>
     <p:ext uri="{EFAFB233-063F-42B5-8137-9DF3F51BA10A}">
-      <p15:sldGuideLst xmlns:p15="http://schemas.microsoft.com/office/powerpoint/2012/main">
+      <p15:sldGuideLst xmlns:p15="http://schemas.microsoft.com/office/powerpoint/2012/main" xmlns="">
         <p15:guide id="1" orient="horz" pos="2160">
           <p15:clr>
             <a:srgbClr val="A4A3A4"/>
@@ -306,7 +306,7 @@
           <a:p>
             <a:fld id="{E6C5019C-3D73-4462-AE02-0DFAF4909032}" type="datetimeFigureOut">
               <a:rPr lang="en-CA" smtClean="0"/>
-              <a:t>2014-03-18</a:t>
+              <a:t>2014-05-24</a:t>
             </a:fld>
             <a:endParaRPr lang="en-CA"/>
           </a:p>
@@ -877,7 +877,7 @@
           <a:p>
             <a:fld id="{1813B5BA-1BDF-2844-BC9F-4745DAF672E8}" type="datetimeFigureOut">
               <a:rPr lang="en-US" smtClean="0"/>
-              <a:t>3/18/2014</a:t>
+              <a:t>5/24/2014</a:t>
             </a:fld>
             <a:endParaRPr lang="en-US"/>
           </a:p>
@@ -1047,7 +1047,7 @@
           <a:p>
             <a:fld id="{1813B5BA-1BDF-2844-BC9F-4745DAF672E8}" type="datetimeFigureOut">
               <a:rPr lang="en-US" smtClean="0"/>
-              <a:t>3/18/2014</a:t>
+              <a:t>5/24/2014</a:t>
             </a:fld>
             <a:endParaRPr lang="en-US"/>
           </a:p>
@@ -1227,7 +1227,7 @@
           <a:p>
             <a:fld id="{1813B5BA-1BDF-2844-BC9F-4745DAF672E8}" type="datetimeFigureOut">
               <a:rPr lang="en-US" smtClean="0"/>
-              <a:t>3/18/2014</a:t>
+              <a:t>5/24/2014</a:t>
             </a:fld>
             <a:endParaRPr lang="en-US"/>
           </a:p>
@@ -1397,7 +1397,7 @@
           <a:p>
             <a:fld id="{1813B5BA-1BDF-2844-BC9F-4745DAF672E8}" type="datetimeFigureOut">
               <a:rPr lang="en-US" smtClean="0"/>
-              <a:t>3/18/2014</a:t>
+              <a:t>5/24/2014</a:t>
             </a:fld>
             <a:endParaRPr lang="en-US"/>
           </a:p>
@@ -1673,7 +1673,7 @@
           <a:p>
             <a:fld id="{1813B5BA-1BDF-2844-BC9F-4745DAF672E8}" type="datetimeFigureOut">
               <a:rPr lang="en-US" smtClean="0"/>
-              <a:t>3/18/2014</a:t>
+              <a:t>5/24/2014</a:t>
             </a:fld>
             <a:endParaRPr lang="en-US"/>
           </a:p>
@@ -1961,7 +1961,7 @@
           <a:p>
             <a:fld id="{1813B5BA-1BDF-2844-BC9F-4745DAF672E8}" type="datetimeFigureOut">
               <a:rPr lang="en-US" smtClean="0"/>
-              <a:t>3/18/2014</a:t>
+              <a:t>5/24/2014</a:t>
             </a:fld>
             <a:endParaRPr lang="en-US"/>
           </a:p>
@@ -2383,7 +2383,7 @@
           <a:p>
             <a:fld id="{1813B5BA-1BDF-2844-BC9F-4745DAF672E8}" type="datetimeFigureOut">
               <a:rPr lang="en-US" smtClean="0"/>
-              <a:t>3/18/2014</a:t>
+              <a:t>5/24/2014</a:t>
             </a:fld>
             <a:endParaRPr lang="en-US"/>
           </a:p>
@@ -2501,7 +2501,7 @@
           <a:p>
             <a:fld id="{1813B5BA-1BDF-2844-BC9F-4745DAF672E8}" type="datetimeFigureOut">
               <a:rPr lang="en-US" smtClean="0"/>
-              <a:t>3/18/2014</a:t>
+              <a:t>5/24/2014</a:t>
             </a:fld>
             <a:endParaRPr lang="en-US"/>
           </a:p>
@@ -2596,7 +2596,7 @@
           <a:p>
             <a:fld id="{1813B5BA-1BDF-2844-BC9F-4745DAF672E8}" type="datetimeFigureOut">
               <a:rPr lang="en-US" smtClean="0"/>
-              <a:t>3/18/2014</a:t>
+              <a:t>5/24/2014</a:t>
             </a:fld>
             <a:endParaRPr lang="en-US"/>
           </a:p>
@@ -2873,7 +2873,7 @@
           <a:p>
             <a:fld id="{1813B5BA-1BDF-2844-BC9F-4745DAF672E8}" type="datetimeFigureOut">
               <a:rPr lang="en-US" smtClean="0"/>
-              <a:t>3/18/2014</a:t>
+              <a:t>5/24/2014</a:t>
             </a:fld>
             <a:endParaRPr lang="en-US"/>
           </a:p>
@@ -3130,7 +3130,7 @@
           <a:p>
             <a:fld id="{1813B5BA-1BDF-2844-BC9F-4745DAF672E8}" type="datetimeFigureOut">
               <a:rPr lang="en-US" smtClean="0"/>
-              <a:t>3/18/2014</a:t>
+              <a:t>5/24/2014</a:t>
             </a:fld>
             <a:endParaRPr lang="en-US"/>
           </a:p>
@@ -3343,7 +3343,7 @@
           <a:p>
             <a:fld id="{1813B5BA-1BDF-2844-BC9F-4745DAF672E8}" type="datetimeFigureOut">
               <a:rPr lang="en-US" smtClean="0"/>
-              <a:t>3/18/2014</a:t>
+              <a:t>5/24/2014</a:t>
             </a:fld>
             <a:endParaRPr lang="en-US"/>
           </a:p>
@@ -3771,8 +3771,12 @@
           <a:lstStyle/>
           <a:p>
             <a:r>
-              <a:rPr lang="en-US" dirty="0" smtClean="0"/>
-              <a:t>Software Testing</a:t>
+              <a:rPr lang="en-US" smtClean="0"/>
+              <a:t>Software </a:t>
+            </a:r>
+            <a:r>
+              <a:rPr lang="en-US" smtClean="0"/>
+              <a:t>Test</a:t>
             </a:r>
             <a:endParaRPr lang="en-US" dirty="0"/>
           </a:p>
@@ -26352,7 +26356,7 @@
   <a:extraClrSchemeLst/>
   <a:extLst>
     <a:ext uri="{05A4C25C-085E-4340-85A3-A5531E510DB2}">
-      <thm15:themeFamily xmlns:thm15="http://schemas.microsoft.com/office/thememl/2012/main" name="Office Theme" id="{62F939B6-93AF-4DB8-9C6B-D6C7DFDC589F}" vid="{4A3C46E8-61CC-4603-A589-7422A47A8E4A}"/>
+      <thm15:themeFamily xmlns:thm15="http://schemas.microsoft.com/office/thememl/2012/main" xmlns="" name="Office Theme" id="{62F939B6-93AF-4DB8-9C6B-D6C7DFDC589F}" vid="{4A3C46E8-61CC-4603-A589-7422A47A8E4A}"/>
     </a:ext>
   </a:extLst>
 </a:theme>

</xml_diff>